<commit_message>
Added Homework for GUI
</commit_message>
<xml_diff>
--- a/11.graphical-user-interface.pptx
+++ b/11.graphical-user-interface.pptx
@@ -174,7 +174,7 @@
           <a:noFill/>
           <a:extLst>
             <a:ext uri="{909E8E84-426E-40dd-AFC4-6F175D3DCCD1}">
-              <a14:hiddenFill xmlns:a14="http://schemas.microsoft.com/office/drawing/2010/main" xmlns="">
+              <a14:hiddenFill xmlns="" xmlns:a14="http://schemas.microsoft.com/office/drawing/2010/main">
                 <a:solidFill>
                   <a:srgbClr val="FFFFFF"/>
                 </a:solidFill>
@@ -234,7 +234,7 @@
             </a:ln>
             <a:extLst>
               <a:ext uri="{91240B29-F687-4f45-9708-019B960494DF}">
-                <a14:hiddenLine xmlns:a14="http://schemas.microsoft.com/office/drawing/2010/main" xmlns="" w="9525">
+                <a14:hiddenLine xmlns="" xmlns:a14="http://schemas.microsoft.com/office/drawing/2010/main" w="9525">
                   <a:solidFill>
                     <a:srgbClr val="000000"/>
                   </a:solidFill>
@@ -324,7 +324,7 @@
             </a:ln>
             <a:extLst>
               <a:ext uri="{91240B29-F687-4f45-9708-019B960494DF}">
-                <a14:hiddenLine xmlns:a14="http://schemas.microsoft.com/office/drawing/2010/main" xmlns="" w="9525">
+                <a14:hiddenLine xmlns="" xmlns:a14="http://schemas.microsoft.com/office/drawing/2010/main" w="9525">
                   <a:solidFill>
                     <a:srgbClr val="000000"/>
                   </a:solidFill>
@@ -414,7 +414,7 @@
             </a:ln>
             <a:extLst>
               <a:ext uri="{91240B29-F687-4f45-9708-019B960494DF}">
-                <a14:hiddenLine xmlns:a14="http://schemas.microsoft.com/office/drawing/2010/main" xmlns="" w="9525">
+                <a14:hiddenLine xmlns="" xmlns:a14="http://schemas.microsoft.com/office/drawing/2010/main" w="9525">
                   <a:solidFill>
                     <a:srgbClr val="000000"/>
                   </a:solidFill>
@@ -448,7 +448,7 @@
             </a:ln>
             <a:extLst>
               <a:ext uri="{91240B29-F687-4f45-9708-019B960494DF}">
-                <a14:hiddenLine xmlns:a14="http://schemas.microsoft.com/office/drawing/2010/main" xmlns="" w="9525">
+                <a14:hiddenLine xmlns="" xmlns:a14="http://schemas.microsoft.com/office/drawing/2010/main" w="9525">
                   <a:solidFill>
                     <a:srgbClr val="000000"/>
                   </a:solidFill>
@@ -538,7 +538,7 @@
             </a:ln>
             <a:extLst>
               <a:ext uri="{91240B29-F687-4f45-9708-019B960494DF}">
-                <a14:hiddenLine xmlns:a14="http://schemas.microsoft.com/office/drawing/2010/main" xmlns="" w="9525">
+                <a14:hiddenLine xmlns="" xmlns:a14="http://schemas.microsoft.com/office/drawing/2010/main" w="9525">
                   <a:solidFill>
                     <a:srgbClr val="000000"/>
                   </a:solidFill>
@@ -600,7 +600,7 @@
             </a:ln>
             <a:extLst>
               <a:ext uri="{91240B29-F687-4f45-9708-019B960494DF}">
-                <a14:hiddenLine xmlns:a14="http://schemas.microsoft.com/office/drawing/2010/main" xmlns="" w="9525">
+                <a14:hiddenLine xmlns="" xmlns:a14="http://schemas.microsoft.com/office/drawing/2010/main" w="9525">
                   <a:solidFill>
                     <a:srgbClr val="000000"/>
                   </a:solidFill>
@@ -662,7 +662,7 @@
             </a:ln>
             <a:extLst>
               <a:ext uri="{91240B29-F687-4f45-9708-019B960494DF}">
-                <a14:hiddenLine xmlns:a14="http://schemas.microsoft.com/office/drawing/2010/main" xmlns="" w="9525">
+                <a14:hiddenLine xmlns="" xmlns:a14="http://schemas.microsoft.com/office/drawing/2010/main" w="9525">
                   <a:solidFill>
                     <a:srgbClr val="000000"/>
                   </a:solidFill>
@@ -752,7 +752,7 @@
             </a:ln>
             <a:extLst>
               <a:ext uri="{91240B29-F687-4f45-9708-019B960494DF}">
-                <a14:hiddenLine xmlns:a14="http://schemas.microsoft.com/office/drawing/2010/main" xmlns="" w="9525">
+                <a14:hiddenLine xmlns="" xmlns:a14="http://schemas.microsoft.com/office/drawing/2010/main" w="9525">
                   <a:solidFill>
                     <a:srgbClr val="000000"/>
                   </a:solidFill>
@@ -814,7 +814,7 @@
             </a:ln>
             <a:extLst>
               <a:ext uri="{91240B29-F687-4f45-9708-019B960494DF}">
-                <a14:hiddenLine xmlns:a14="http://schemas.microsoft.com/office/drawing/2010/main" xmlns="" w="9525">
+                <a14:hiddenLine xmlns="" xmlns:a14="http://schemas.microsoft.com/office/drawing/2010/main" w="9525">
                   <a:solidFill>
                     <a:srgbClr val="000000"/>
                   </a:solidFill>
@@ -876,7 +876,7 @@
             </a:ln>
             <a:extLst>
               <a:ext uri="{91240B29-F687-4f45-9708-019B960494DF}">
-                <a14:hiddenLine xmlns:a14="http://schemas.microsoft.com/office/drawing/2010/main" xmlns="" w="9525">
+                <a14:hiddenLine xmlns="" xmlns:a14="http://schemas.microsoft.com/office/drawing/2010/main" w="9525">
                   <a:solidFill>
                     <a:srgbClr val="000000"/>
                   </a:solidFill>
@@ -966,7 +966,7 @@
             </a:ln>
             <a:extLst>
               <a:ext uri="{91240B29-F687-4f45-9708-019B960494DF}">
-                <a14:hiddenLine xmlns:a14="http://schemas.microsoft.com/office/drawing/2010/main" xmlns="" w="9525">
+                <a14:hiddenLine xmlns="" xmlns:a14="http://schemas.microsoft.com/office/drawing/2010/main" w="9525">
                   <a:solidFill>
                     <a:srgbClr val="000000"/>
                   </a:solidFill>
@@ -1056,7 +1056,7 @@
             </a:ln>
             <a:extLst>
               <a:ext uri="{91240B29-F687-4f45-9708-019B960494DF}">
-                <a14:hiddenLine xmlns:a14="http://schemas.microsoft.com/office/drawing/2010/main" xmlns="" w="9525">
+                <a14:hiddenLine xmlns="" xmlns:a14="http://schemas.microsoft.com/office/drawing/2010/main" w="9525">
                   <a:solidFill>
                     <a:srgbClr val="000000"/>
                   </a:solidFill>
@@ -1118,7 +1118,7 @@
             </a:ln>
             <a:extLst>
               <a:ext uri="{91240B29-F687-4f45-9708-019B960494DF}">
-                <a14:hiddenLine xmlns:a14="http://schemas.microsoft.com/office/drawing/2010/main" xmlns="" w="9525">
+                <a14:hiddenLine xmlns="" xmlns:a14="http://schemas.microsoft.com/office/drawing/2010/main" w="9525">
                   <a:solidFill>
                     <a:srgbClr val="000000"/>
                   </a:solidFill>
@@ -1228,7 +1228,7 @@
             </a:ln>
             <a:extLst>
               <a:ext uri="{91240B29-F687-4f45-9708-019B960494DF}">
-                <a14:hiddenLine xmlns:a14="http://schemas.microsoft.com/office/drawing/2010/main" xmlns="" w="9525">
+                <a14:hiddenLine xmlns="" xmlns:a14="http://schemas.microsoft.com/office/drawing/2010/main" w="9525">
                   <a:solidFill>
                     <a:srgbClr val="000000"/>
                   </a:solidFill>
@@ -1290,7 +1290,7 @@
             </a:ln>
             <a:extLst>
               <a:ext uri="{91240B29-F687-4f45-9708-019B960494DF}">
-                <a14:hiddenLine xmlns:a14="http://schemas.microsoft.com/office/drawing/2010/main" xmlns="" w="9525">
+                <a14:hiddenLine xmlns="" xmlns:a14="http://schemas.microsoft.com/office/drawing/2010/main" w="9525">
                   <a:solidFill>
                     <a:srgbClr val="000000"/>
                   </a:solidFill>
@@ -1380,7 +1380,7 @@
             </a:ln>
             <a:extLst>
               <a:ext uri="{91240B29-F687-4f45-9708-019B960494DF}">
-                <a14:hiddenLine xmlns:a14="http://schemas.microsoft.com/office/drawing/2010/main" xmlns="" w="9525">
+                <a14:hiddenLine xmlns="" xmlns:a14="http://schemas.microsoft.com/office/drawing/2010/main" w="9525">
                   <a:solidFill>
                     <a:srgbClr val="000000"/>
                   </a:solidFill>
@@ -1470,7 +1470,7 @@
             </a:ln>
             <a:extLst>
               <a:ext uri="{91240B29-F687-4f45-9708-019B960494DF}">
-                <a14:hiddenLine xmlns:a14="http://schemas.microsoft.com/office/drawing/2010/main" xmlns="" w="9525">
+                <a14:hiddenLine xmlns="" xmlns:a14="http://schemas.microsoft.com/office/drawing/2010/main" w="9525">
                   <a:solidFill>
                     <a:srgbClr val="000000"/>
                   </a:solidFill>
@@ -1532,7 +1532,7 @@
             </a:ln>
             <a:extLst>
               <a:ext uri="{91240B29-F687-4f45-9708-019B960494DF}">
-                <a14:hiddenLine xmlns:a14="http://schemas.microsoft.com/office/drawing/2010/main" xmlns="" w="9525">
+                <a14:hiddenLine xmlns="" xmlns:a14="http://schemas.microsoft.com/office/drawing/2010/main" w="9525">
                   <a:solidFill>
                     <a:srgbClr val="000000"/>
                   </a:solidFill>
@@ -1622,7 +1622,7 @@
             </a:ln>
             <a:extLst>
               <a:ext uri="{91240B29-F687-4f45-9708-019B960494DF}">
-                <a14:hiddenLine xmlns:a14="http://schemas.microsoft.com/office/drawing/2010/main" xmlns="" w="9525">
+                <a14:hiddenLine xmlns="" xmlns:a14="http://schemas.microsoft.com/office/drawing/2010/main" w="9525">
                   <a:solidFill>
                     <a:srgbClr val="000000"/>
                   </a:solidFill>
@@ -1712,7 +1712,7 @@
             </a:ln>
             <a:extLst>
               <a:ext uri="{91240B29-F687-4f45-9708-019B960494DF}">
-                <a14:hiddenLine xmlns:a14="http://schemas.microsoft.com/office/drawing/2010/main" xmlns="" w="9525">
+                <a14:hiddenLine xmlns="" xmlns:a14="http://schemas.microsoft.com/office/drawing/2010/main" w="9525">
                   <a:solidFill>
                     <a:srgbClr val="000000"/>
                   </a:solidFill>
@@ -1768,7 +1768,7 @@
             </a:ln>
             <a:extLst>
               <a:ext uri="{91240B29-F687-4f45-9708-019B960494DF}">
-                <a14:hiddenLine xmlns:a14="http://schemas.microsoft.com/office/drawing/2010/main" xmlns="" w="9525">
+                <a14:hiddenLine xmlns="" xmlns:a14="http://schemas.microsoft.com/office/drawing/2010/main" w="9525">
                   <a:solidFill>
                     <a:srgbClr val="000000"/>
                   </a:solidFill>
@@ -1858,7 +1858,7 @@
             </a:ln>
             <a:extLst>
               <a:ext uri="{91240B29-F687-4f45-9708-019B960494DF}">
-                <a14:hiddenLine xmlns:a14="http://schemas.microsoft.com/office/drawing/2010/main" xmlns="" w="9525">
+                <a14:hiddenLine xmlns="" xmlns:a14="http://schemas.microsoft.com/office/drawing/2010/main" w="9525">
                   <a:solidFill>
                     <a:srgbClr val="000000"/>
                   </a:solidFill>
@@ -1914,7 +1914,7 @@
             </a:ln>
             <a:extLst>
               <a:ext uri="{91240B29-F687-4f45-9708-019B960494DF}">
-                <a14:hiddenLine xmlns:a14="http://schemas.microsoft.com/office/drawing/2010/main" xmlns="" w="9525">
+                <a14:hiddenLine xmlns="" xmlns:a14="http://schemas.microsoft.com/office/drawing/2010/main" w="9525">
                   <a:solidFill>
                     <a:srgbClr val="000000"/>
                   </a:solidFill>
@@ -2004,7 +2004,7 @@
             </a:ln>
             <a:extLst>
               <a:ext uri="{91240B29-F687-4f45-9708-019B960494DF}">
-                <a14:hiddenLine xmlns:a14="http://schemas.microsoft.com/office/drawing/2010/main" xmlns="" w="9525">
+                <a14:hiddenLine xmlns="" xmlns:a14="http://schemas.microsoft.com/office/drawing/2010/main" w="9525">
                   <a:solidFill>
                     <a:srgbClr val="000000"/>
                   </a:solidFill>
@@ -2072,7 +2072,7 @@
             </a:ln>
             <a:extLst>
               <a:ext uri="{91240B29-F687-4f45-9708-019B960494DF}">
-                <a14:hiddenLine xmlns:a14="http://schemas.microsoft.com/office/drawing/2010/main" xmlns="" w="9525">
+                <a14:hiddenLine xmlns="" xmlns:a14="http://schemas.microsoft.com/office/drawing/2010/main" w="9525">
                   <a:solidFill>
                     <a:srgbClr val="000000"/>
                   </a:solidFill>
@@ -2162,7 +2162,7 @@
             </a:ln>
             <a:extLst>
               <a:ext uri="{91240B29-F687-4f45-9708-019B960494DF}">
-                <a14:hiddenLine xmlns:a14="http://schemas.microsoft.com/office/drawing/2010/main" xmlns="" w="9525">
+                <a14:hiddenLine xmlns="" xmlns:a14="http://schemas.microsoft.com/office/drawing/2010/main" w="9525">
                   <a:solidFill>
                     <a:srgbClr val="000000"/>
                   </a:solidFill>
@@ -2230,7 +2230,7 @@
             </a:ln>
             <a:extLst>
               <a:ext uri="{91240B29-F687-4f45-9708-019B960494DF}">
-                <a14:hiddenLine xmlns:a14="http://schemas.microsoft.com/office/drawing/2010/main" xmlns="" w="9525">
+                <a14:hiddenLine xmlns="" xmlns:a14="http://schemas.microsoft.com/office/drawing/2010/main" w="9525">
                   <a:solidFill>
                     <a:srgbClr val="000000"/>
                   </a:solidFill>
@@ -2320,7 +2320,7 @@
             </a:ln>
             <a:extLst>
               <a:ext uri="{91240B29-F687-4f45-9708-019B960494DF}">
-                <a14:hiddenLine xmlns:a14="http://schemas.microsoft.com/office/drawing/2010/main" xmlns="" w="9525">
+                <a14:hiddenLine xmlns="" xmlns:a14="http://schemas.microsoft.com/office/drawing/2010/main" w="9525">
                   <a:solidFill>
                     <a:srgbClr val="000000"/>
                   </a:solidFill>
@@ -2354,7 +2354,7 @@
             </a:ln>
             <a:extLst>
               <a:ext uri="{91240B29-F687-4f45-9708-019B960494DF}">
-                <a14:hiddenLine xmlns:a14="http://schemas.microsoft.com/office/drawing/2010/main" xmlns="" w="9525">
+                <a14:hiddenLine xmlns="" xmlns:a14="http://schemas.microsoft.com/office/drawing/2010/main" w="9525">
                   <a:solidFill>
                     <a:srgbClr val="000000"/>
                   </a:solidFill>
@@ -2444,7 +2444,7 @@
             </a:ln>
             <a:extLst>
               <a:ext uri="{91240B29-F687-4f45-9708-019B960494DF}">
-                <a14:hiddenLine xmlns:a14="http://schemas.microsoft.com/office/drawing/2010/main" xmlns="" w="9525">
+                <a14:hiddenLine xmlns="" xmlns:a14="http://schemas.microsoft.com/office/drawing/2010/main" w="9525">
                   <a:solidFill>
                     <a:srgbClr val="000000"/>
                   </a:solidFill>
@@ -2506,7 +2506,7 @@
             </a:ln>
             <a:extLst>
               <a:ext uri="{91240B29-F687-4f45-9708-019B960494DF}">
-                <a14:hiddenLine xmlns:a14="http://schemas.microsoft.com/office/drawing/2010/main" xmlns="" w="9525">
+                <a14:hiddenLine xmlns="" xmlns:a14="http://schemas.microsoft.com/office/drawing/2010/main" w="9525">
                   <a:solidFill>
                     <a:srgbClr val="000000"/>
                   </a:solidFill>
@@ -2568,7 +2568,7 @@
             </a:ln>
             <a:extLst>
               <a:ext uri="{91240B29-F687-4f45-9708-019B960494DF}">
-                <a14:hiddenLine xmlns:a14="http://schemas.microsoft.com/office/drawing/2010/main" xmlns="" w="9525">
+                <a14:hiddenLine xmlns="" xmlns:a14="http://schemas.microsoft.com/office/drawing/2010/main" w="9525">
                   <a:solidFill>
                     <a:srgbClr val="000000"/>
                   </a:solidFill>
@@ -2658,7 +2658,7 @@
             </a:ln>
             <a:extLst>
               <a:ext uri="{91240B29-F687-4f45-9708-019B960494DF}">
-                <a14:hiddenLine xmlns:a14="http://schemas.microsoft.com/office/drawing/2010/main" xmlns="" w="9525">
+                <a14:hiddenLine xmlns="" xmlns:a14="http://schemas.microsoft.com/office/drawing/2010/main" w="9525">
                   <a:solidFill>
                     <a:srgbClr val="000000"/>
                   </a:solidFill>
@@ -2726,7 +2726,7 @@
             </a:ln>
             <a:extLst>
               <a:ext uri="{91240B29-F687-4f45-9708-019B960494DF}">
-                <a14:hiddenLine xmlns:a14="http://schemas.microsoft.com/office/drawing/2010/main" xmlns="" w="9525">
+                <a14:hiddenLine xmlns="" xmlns:a14="http://schemas.microsoft.com/office/drawing/2010/main" w="9525">
                   <a:solidFill>
                     <a:srgbClr val="000000"/>
                   </a:solidFill>
@@ -2788,7 +2788,7 @@
             </a:ln>
             <a:extLst>
               <a:ext uri="{91240B29-F687-4f45-9708-019B960494DF}">
-                <a14:hiddenLine xmlns:a14="http://schemas.microsoft.com/office/drawing/2010/main" xmlns="" w="9525">
+                <a14:hiddenLine xmlns="" xmlns:a14="http://schemas.microsoft.com/office/drawing/2010/main" w="9525">
                   <a:solidFill>
                     <a:srgbClr val="000000"/>
                   </a:solidFill>
@@ -2878,7 +2878,7 @@
             </a:ln>
             <a:extLst>
               <a:ext uri="{91240B29-F687-4f45-9708-019B960494DF}">
-                <a14:hiddenLine xmlns:a14="http://schemas.microsoft.com/office/drawing/2010/main" xmlns="" w="9525">
+                <a14:hiddenLine xmlns="" xmlns:a14="http://schemas.microsoft.com/office/drawing/2010/main" w="9525">
                   <a:solidFill>
                     <a:srgbClr val="000000"/>
                   </a:solidFill>
@@ -2940,7 +2940,7 @@
             </a:ln>
             <a:extLst>
               <a:ext uri="{91240B29-F687-4f45-9708-019B960494DF}">
-                <a14:hiddenLine xmlns:a14="http://schemas.microsoft.com/office/drawing/2010/main" xmlns="" w="9525">
+                <a14:hiddenLine xmlns="" xmlns:a14="http://schemas.microsoft.com/office/drawing/2010/main" w="9525">
                   <a:solidFill>
                     <a:srgbClr val="000000"/>
                   </a:solidFill>
@@ -3030,7 +3030,7 @@
             </a:ln>
             <a:extLst>
               <a:ext uri="{91240B29-F687-4f45-9708-019B960494DF}">
-                <a14:hiddenLine xmlns:a14="http://schemas.microsoft.com/office/drawing/2010/main" xmlns="" w="9525">
+                <a14:hiddenLine xmlns="" xmlns:a14="http://schemas.microsoft.com/office/drawing/2010/main" w="9525">
                   <a:solidFill>
                     <a:srgbClr val="000000"/>
                   </a:solidFill>
@@ -3092,7 +3092,7 @@
             </a:ln>
             <a:extLst>
               <a:ext uri="{91240B29-F687-4f45-9708-019B960494DF}">
-                <a14:hiddenLine xmlns:a14="http://schemas.microsoft.com/office/drawing/2010/main" xmlns="" w="9525">
+                <a14:hiddenLine xmlns="" xmlns:a14="http://schemas.microsoft.com/office/drawing/2010/main" w="9525">
                   <a:solidFill>
                     <a:srgbClr val="000000"/>
                   </a:solidFill>
@@ -3182,7 +3182,7 @@
             </a:ln>
             <a:extLst>
               <a:ext uri="{91240B29-F687-4f45-9708-019B960494DF}">
-                <a14:hiddenLine xmlns:a14="http://schemas.microsoft.com/office/drawing/2010/main" xmlns="" w="9525">
+                <a14:hiddenLine xmlns="" xmlns:a14="http://schemas.microsoft.com/office/drawing/2010/main" w="9525">
                   <a:solidFill>
                     <a:srgbClr val="000000"/>
                   </a:solidFill>
@@ -3216,7 +3216,7 @@
             </a:ln>
             <a:extLst>
               <a:ext uri="{91240B29-F687-4f45-9708-019B960494DF}">
-                <a14:hiddenLine xmlns:a14="http://schemas.microsoft.com/office/drawing/2010/main" xmlns="" w="9525">
+                <a14:hiddenLine xmlns="" xmlns:a14="http://schemas.microsoft.com/office/drawing/2010/main" w="9525">
                   <a:solidFill>
                     <a:srgbClr val="000000"/>
                   </a:solidFill>
@@ -3281,7 +3281,7 @@
             </a:ln>
             <a:extLst>
               <a:ext uri="{91240B29-F687-4f45-9708-019B960494DF}">
-                <a14:hiddenLine xmlns:a14="http://schemas.microsoft.com/office/drawing/2010/main" xmlns="" w="9525">
+                <a14:hiddenLine xmlns="" xmlns:a14="http://schemas.microsoft.com/office/drawing/2010/main" w="9525">
                   <a:solidFill>
                     <a:srgbClr val="000000"/>
                   </a:solidFill>
@@ -3371,7 +3371,7 @@
             </a:ln>
             <a:extLst>
               <a:ext uri="{91240B29-F687-4f45-9708-019B960494DF}">
-                <a14:hiddenLine xmlns:a14="http://schemas.microsoft.com/office/drawing/2010/main" xmlns="" w="9525">
+                <a14:hiddenLine xmlns="" xmlns:a14="http://schemas.microsoft.com/office/drawing/2010/main" w="9525">
                   <a:solidFill>
                     <a:srgbClr val="000000"/>
                   </a:solidFill>
@@ -3433,7 +3433,7 @@
             </a:ln>
             <a:extLst>
               <a:ext uri="{91240B29-F687-4f45-9708-019B960494DF}">
-                <a14:hiddenLine xmlns:a14="http://schemas.microsoft.com/office/drawing/2010/main" xmlns="" w="9525">
+                <a14:hiddenLine xmlns="" xmlns:a14="http://schemas.microsoft.com/office/drawing/2010/main" w="9525">
                   <a:solidFill>
                     <a:srgbClr val="000000"/>
                   </a:solidFill>
@@ -3523,7 +3523,7 @@
             </a:ln>
             <a:extLst>
               <a:ext uri="{91240B29-F687-4f45-9708-019B960494DF}">
-                <a14:hiddenLine xmlns:a14="http://schemas.microsoft.com/office/drawing/2010/main" xmlns="" w="9525">
+                <a14:hiddenLine xmlns="" xmlns:a14="http://schemas.microsoft.com/office/drawing/2010/main" w="9525">
                   <a:solidFill>
                     <a:srgbClr val="000000"/>
                   </a:solidFill>
@@ -3613,7 +3613,7 @@
             </a:ln>
             <a:extLst>
               <a:ext uri="{91240B29-F687-4f45-9708-019B960494DF}">
-                <a14:hiddenLine xmlns:a14="http://schemas.microsoft.com/office/drawing/2010/main" xmlns="" w="9525">
+                <a14:hiddenLine xmlns="" xmlns:a14="http://schemas.microsoft.com/office/drawing/2010/main" w="9525">
                   <a:solidFill>
                     <a:srgbClr val="000000"/>
                   </a:solidFill>
@@ -3678,7 +3678,7 @@
             </a:ln>
             <a:extLst>
               <a:ext uri="{91240B29-F687-4f45-9708-019B960494DF}">
-                <a14:hiddenLine xmlns:a14="http://schemas.microsoft.com/office/drawing/2010/main" xmlns="" w="9525">
+                <a14:hiddenLine xmlns="" xmlns:a14="http://schemas.microsoft.com/office/drawing/2010/main" w="9525">
                   <a:solidFill>
                     <a:srgbClr val="000000"/>
                   </a:solidFill>
@@ -3740,7 +3740,7 @@
             </a:ln>
             <a:extLst>
               <a:ext uri="{91240B29-F687-4f45-9708-019B960494DF}">
-                <a14:hiddenLine xmlns:a14="http://schemas.microsoft.com/office/drawing/2010/main" xmlns="" w="9525">
+                <a14:hiddenLine xmlns="" xmlns:a14="http://schemas.microsoft.com/office/drawing/2010/main" w="9525">
                   <a:solidFill>
                     <a:srgbClr val="000000"/>
                   </a:solidFill>
@@ -3830,7 +3830,7 @@
             </a:ln>
             <a:extLst>
               <a:ext uri="{91240B29-F687-4f45-9708-019B960494DF}">
-                <a14:hiddenLine xmlns:a14="http://schemas.microsoft.com/office/drawing/2010/main" xmlns="" w="9525">
+                <a14:hiddenLine xmlns="" xmlns:a14="http://schemas.microsoft.com/office/drawing/2010/main" w="9525">
                   <a:solidFill>
                     <a:srgbClr val="000000"/>
                   </a:solidFill>
@@ -3920,7 +3920,7 @@
             </a:ln>
             <a:extLst>
               <a:ext uri="{91240B29-F687-4f45-9708-019B960494DF}">
-                <a14:hiddenLine xmlns:a14="http://schemas.microsoft.com/office/drawing/2010/main" xmlns="" w="9525">
+                <a14:hiddenLine xmlns="" xmlns:a14="http://schemas.microsoft.com/office/drawing/2010/main" w="9525">
                   <a:solidFill>
                     <a:srgbClr val="000000"/>
                   </a:solidFill>
@@ -3982,7 +3982,7 @@
             </a:ln>
             <a:extLst>
               <a:ext uri="{91240B29-F687-4f45-9708-019B960494DF}">
-                <a14:hiddenLine xmlns:a14="http://schemas.microsoft.com/office/drawing/2010/main" xmlns="" w="9525">
+                <a14:hiddenLine xmlns="" xmlns:a14="http://schemas.microsoft.com/office/drawing/2010/main" w="9525">
                   <a:solidFill>
                     <a:srgbClr val="000000"/>
                   </a:solidFill>
@@ -4102,7 +4102,7 @@
             </a:ln>
             <a:extLst>
               <a:ext uri="{91240B29-F687-4f45-9708-019B960494DF}">
-                <a14:hiddenLine xmlns:a14="http://schemas.microsoft.com/office/drawing/2010/main" xmlns="" w="9525">
+                <a14:hiddenLine xmlns="" xmlns:a14="http://schemas.microsoft.com/office/drawing/2010/main" w="9525">
                   <a:solidFill>
                     <a:srgbClr val="000000"/>
                   </a:solidFill>
@@ -4170,7 +4170,7 @@
             </a:ln>
             <a:extLst>
               <a:ext uri="{91240B29-F687-4f45-9708-019B960494DF}">
-                <a14:hiddenLine xmlns:a14="http://schemas.microsoft.com/office/drawing/2010/main" xmlns="" w="9525">
+                <a14:hiddenLine xmlns="" xmlns:a14="http://schemas.microsoft.com/office/drawing/2010/main" w="9525">
                   <a:solidFill>
                     <a:srgbClr val="000000"/>
                   </a:solidFill>
@@ -4260,7 +4260,7 @@
             </a:ln>
             <a:extLst>
               <a:ext uri="{91240B29-F687-4f45-9708-019B960494DF}">
-                <a14:hiddenLine xmlns:a14="http://schemas.microsoft.com/office/drawing/2010/main" xmlns="" w="9525">
+                <a14:hiddenLine xmlns="" xmlns:a14="http://schemas.microsoft.com/office/drawing/2010/main" w="9525">
                   <a:solidFill>
                     <a:srgbClr val="000000"/>
                   </a:solidFill>
@@ -4400,7 +4400,7 @@
           <a:p>
             <a:fld id="{841D4EFB-1649-4F74-89D1-9FCA056B78EF}" type="datetimeFigureOut">
               <a:rPr lang="en-US" smtClean="0"/>
-              <a:t>1/30/2015</a:t>
+              <a:t>30-Jan-15</a:t>
             </a:fld>
             <a:endParaRPr lang="en-US"/>
           </a:p>
@@ -4667,7 +4667,7 @@
           <a:p>
             <a:fld id="{841D4EFB-1649-4F74-89D1-9FCA056B78EF}" type="datetimeFigureOut">
               <a:rPr lang="en-US" smtClean="0"/>
-              <a:t>1/30/2015</a:t>
+              <a:t>30-Jan-15</a:t>
             </a:fld>
             <a:endParaRPr lang="en-US"/>
           </a:p>
@@ -4863,7 +4863,7 @@
           <a:p>
             <a:fld id="{841D4EFB-1649-4F74-89D1-9FCA056B78EF}" type="datetimeFigureOut">
               <a:rPr lang="en-US" smtClean="0"/>
-              <a:t>1/30/2015</a:t>
+              <a:t>30-Jan-15</a:t>
             </a:fld>
             <a:endParaRPr lang="en-US"/>
           </a:p>
@@ -5126,7 +5126,7 @@
           <a:p>
             <a:fld id="{841D4EFB-1649-4F74-89D1-9FCA056B78EF}" type="datetimeFigureOut">
               <a:rPr lang="en-US" smtClean="0"/>
-              <a:t>1/30/2015</a:t>
+              <a:t>30-Jan-15</a:t>
             </a:fld>
             <a:endParaRPr lang="en-US"/>
           </a:p>
@@ -5560,7 +5560,7 @@
           <a:p>
             <a:fld id="{841D4EFB-1649-4F74-89D1-9FCA056B78EF}" type="datetimeFigureOut">
               <a:rPr lang="en-US" smtClean="0"/>
-              <a:t>1/30/2015</a:t>
+              <a:t>30-Jan-15</a:t>
             </a:fld>
             <a:endParaRPr lang="en-US"/>
           </a:p>
@@ -6106,7 +6106,7 @@
           <a:p>
             <a:fld id="{841D4EFB-1649-4F74-89D1-9FCA056B78EF}" type="datetimeFigureOut">
               <a:rPr lang="en-US" smtClean="0"/>
-              <a:t>1/30/2015</a:t>
+              <a:t>30-Jan-15</a:t>
             </a:fld>
             <a:endParaRPr lang="en-US"/>
           </a:p>
@@ -6826,7 +6826,7 @@
           <a:p>
             <a:fld id="{841D4EFB-1649-4F74-89D1-9FCA056B78EF}" type="datetimeFigureOut">
               <a:rPr lang="en-US" smtClean="0"/>
-              <a:t>1/30/2015</a:t>
+              <a:t>30-Jan-15</a:t>
             </a:fld>
             <a:endParaRPr lang="en-US"/>
           </a:p>
@@ -6996,7 +6996,7 @@
           <a:p>
             <a:fld id="{841D4EFB-1649-4F74-89D1-9FCA056B78EF}" type="datetimeFigureOut">
               <a:rPr lang="en-US" smtClean="0"/>
-              <a:t>1/30/2015</a:t>
+              <a:t>30-Jan-15</a:t>
             </a:fld>
             <a:endParaRPr lang="en-US"/>
           </a:p>
@@ -7176,7 +7176,7 @@
           <a:p>
             <a:fld id="{841D4EFB-1649-4F74-89D1-9FCA056B78EF}" type="datetimeFigureOut">
               <a:rPr lang="en-US" smtClean="0"/>
-              <a:t>1/30/2015</a:t>
+              <a:t>30-Jan-15</a:t>
             </a:fld>
             <a:endParaRPr lang="en-US"/>
           </a:p>
@@ -7346,7 +7346,7 @@
           <a:p>
             <a:fld id="{841D4EFB-1649-4F74-89D1-9FCA056B78EF}" type="datetimeFigureOut">
               <a:rPr lang="en-US" smtClean="0"/>
-              <a:t>1/30/2015</a:t>
+              <a:t>30-Jan-15</a:t>
             </a:fld>
             <a:endParaRPr lang="en-US"/>
           </a:p>
@@ -7596,7 +7596,7 @@
           <a:p>
             <a:fld id="{841D4EFB-1649-4F74-89D1-9FCA056B78EF}" type="datetimeFigureOut">
               <a:rPr lang="en-US" smtClean="0"/>
-              <a:t>1/30/2015</a:t>
+              <a:t>30-Jan-15</a:t>
             </a:fld>
             <a:endParaRPr lang="en-US"/>
           </a:p>
@@ -7828,7 +7828,7 @@
           <a:p>
             <a:fld id="{841D4EFB-1649-4F74-89D1-9FCA056B78EF}" type="datetimeFigureOut">
               <a:rPr lang="en-US" smtClean="0"/>
-              <a:t>1/30/2015</a:t>
+              <a:t>30-Jan-15</a:t>
             </a:fld>
             <a:endParaRPr lang="en-US"/>
           </a:p>
@@ -8209,7 +8209,7 @@
           <a:p>
             <a:fld id="{841D4EFB-1649-4F74-89D1-9FCA056B78EF}" type="datetimeFigureOut">
               <a:rPr lang="en-US" smtClean="0"/>
-              <a:t>1/30/2015</a:t>
+              <a:t>30-Jan-15</a:t>
             </a:fld>
             <a:endParaRPr lang="en-US"/>
           </a:p>
@@ -8327,7 +8327,7 @@
           <a:p>
             <a:fld id="{841D4EFB-1649-4F74-89D1-9FCA056B78EF}" type="datetimeFigureOut">
               <a:rPr lang="en-US" smtClean="0"/>
-              <a:t>1/30/2015</a:t>
+              <a:t>30-Jan-15</a:t>
             </a:fld>
             <a:endParaRPr lang="en-US"/>
           </a:p>
@@ -8422,7 +8422,7 @@
           <a:p>
             <a:fld id="{841D4EFB-1649-4F74-89D1-9FCA056B78EF}" type="datetimeFigureOut">
               <a:rPr lang="en-US" smtClean="0"/>
-              <a:t>1/30/2015</a:t>
+              <a:t>30-Jan-15</a:t>
             </a:fld>
             <a:endParaRPr lang="en-US"/>
           </a:p>
@@ -8671,7 +8671,7 @@
           <a:p>
             <a:fld id="{841D4EFB-1649-4F74-89D1-9FCA056B78EF}" type="datetimeFigureOut">
               <a:rPr lang="en-US" smtClean="0"/>
-              <a:t>1/30/2015</a:t>
+              <a:t>30-Jan-15</a:t>
             </a:fld>
             <a:endParaRPr lang="en-US"/>
           </a:p>
@@ -8951,7 +8951,7 @@
           <a:p>
             <a:fld id="{841D4EFB-1649-4F74-89D1-9FCA056B78EF}" type="datetimeFigureOut">
               <a:rPr lang="en-US" smtClean="0"/>
-              <a:t>1/30/2015</a:t>
+              <a:t>30-Jan-15</a:t>
             </a:fld>
             <a:endParaRPr lang="en-US"/>
           </a:p>
@@ -9067,7 +9067,7 @@
           <a:noFill/>
           <a:extLst>
             <a:ext uri="{909E8E84-426E-40dd-AFC4-6F175D3DCCD1}">
-              <a14:hiddenFill xmlns:a14="http://schemas.microsoft.com/office/drawing/2010/main" xmlns="">
+              <a14:hiddenFill xmlns="" xmlns:a14="http://schemas.microsoft.com/office/drawing/2010/main">
                 <a:solidFill>
                   <a:srgbClr val="FFFFFF"/>
                 </a:solidFill>
@@ -9141,7 +9141,7 @@
               </a:ln>
               <a:extLst>
                 <a:ext uri="{91240B29-F687-4f45-9708-019B960494DF}">
-                  <a14:hiddenLine xmlns:a14="http://schemas.microsoft.com/office/drawing/2010/main" xmlns="" w="9525">
+                  <a14:hiddenLine xmlns="" xmlns:a14="http://schemas.microsoft.com/office/drawing/2010/main" w="9525">
                     <a:solidFill>
                       <a:srgbClr val="000000"/>
                     </a:solidFill>
@@ -9231,7 +9231,7 @@
               </a:ln>
               <a:extLst>
                 <a:ext uri="{91240B29-F687-4f45-9708-019B960494DF}">
-                  <a14:hiddenLine xmlns:a14="http://schemas.microsoft.com/office/drawing/2010/main" xmlns="" w="9525">
+                  <a14:hiddenLine xmlns="" xmlns:a14="http://schemas.microsoft.com/office/drawing/2010/main" w="9525">
                     <a:solidFill>
                       <a:srgbClr val="000000"/>
                     </a:solidFill>
@@ -9321,7 +9321,7 @@
               </a:ln>
               <a:extLst>
                 <a:ext uri="{91240B29-F687-4f45-9708-019B960494DF}">
-                  <a14:hiddenLine xmlns:a14="http://schemas.microsoft.com/office/drawing/2010/main" xmlns="" w="9525">
+                  <a14:hiddenLine xmlns="" xmlns:a14="http://schemas.microsoft.com/office/drawing/2010/main" w="9525">
                     <a:solidFill>
                       <a:srgbClr val="000000"/>
                     </a:solidFill>
@@ -9383,7 +9383,7 @@
               </a:ln>
               <a:extLst>
                 <a:ext uri="{91240B29-F687-4f45-9708-019B960494DF}">
-                  <a14:hiddenLine xmlns:a14="http://schemas.microsoft.com/office/drawing/2010/main" xmlns="" w="9525">
+                  <a14:hiddenLine xmlns="" xmlns:a14="http://schemas.microsoft.com/office/drawing/2010/main" w="9525">
                     <a:solidFill>
                       <a:srgbClr val="000000"/>
                     </a:solidFill>
@@ -9473,7 +9473,7 @@
               </a:ln>
               <a:extLst>
                 <a:ext uri="{91240B29-F687-4f45-9708-019B960494DF}">
-                  <a14:hiddenLine xmlns:a14="http://schemas.microsoft.com/office/drawing/2010/main" xmlns="" w="9525">
+                  <a14:hiddenLine xmlns="" xmlns:a14="http://schemas.microsoft.com/office/drawing/2010/main" w="9525">
                     <a:solidFill>
                       <a:srgbClr val="000000"/>
                     </a:solidFill>
@@ -9535,7 +9535,7 @@
               </a:ln>
               <a:extLst>
                 <a:ext uri="{91240B29-F687-4f45-9708-019B960494DF}">
-                  <a14:hiddenLine xmlns:a14="http://schemas.microsoft.com/office/drawing/2010/main" xmlns="" w="9525">
+                  <a14:hiddenLine xmlns="" xmlns:a14="http://schemas.microsoft.com/office/drawing/2010/main" w="9525">
                     <a:solidFill>
                       <a:srgbClr val="000000"/>
                     </a:solidFill>
@@ -9597,7 +9597,7 @@
               </a:ln>
               <a:extLst>
                 <a:ext uri="{91240B29-F687-4f45-9708-019B960494DF}">
-                  <a14:hiddenLine xmlns:a14="http://schemas.microsoft.com/office/drawing/2010/main" xmlns="" w="9525">
+                  <a14:hiddenLine xmlns="" xmlns:a14="http://schemas.microsoft.com/office/drawing/2010/main" w="9525">
                     <a:solidFill>
                       <a:srgbClr val="000000"/>
                     </a:solidFill>
@@ -9687,7 +9687,7 @@
               </a:ln>
               <a:extLst>
                 <a:ext uri="{91240B29-F687-4f45-9708-019B960494DF}">
-                  <a14:hiddenLine xmlns:a14="http://schemas.microsoft.com/office/drawing/2010/main" xmlns="" w="9525">
+                  <a14:hiddenLine xmlns="" xmlns:a14="http://schemas.microsoft.com/office/drawing/2010/main" w="9525">
                     <a:solidFill>
                       <a:srgbClr val="000000"/>
                     </a:solidFill>
@@ -9777,7 +9777,7 @@
               </a:ln>
               <a:extLst>
                 <a:ext uri="{91240B29-F687-4f45-9708-019B960494DF}">
-                  <a14:hiddenLine xmlns:a14="http://schemas.microsoft.com/office/drawing/2010/main" xmlns="" w="9525">
+                  <a14:hiddenLine xmlns="" xmlns:a14="http://schemas.microsoft.com/office/drawing/2010/main" w="9525">
                     <a:solidFill>
                       <a:srgbClr val="000000"/>
                     </a:solidFill>
@@ -9839,7 +9839,7 @@
               </a:ln>
               <a:extLst>
                 <a:ext uri="{91240B29-F687-4f45-9708-019B960494DF}">
-                  <a14:hiddenLine xmlns:a14="http://schemas.microsoft.com/office/drawing/2010/main" xmlns="" w="9525">
+                  <a14:hiddenLine xmlns="" xmlns:a14="http://schemas.microsoft.com/office/drawing/2010/main" w="9525">
                     <a:solidFill>
                       <a:srgbClr val="000000"/>
                     </a:solidFill>
@@ -9949,7 +9949,7 @@
               </a:ln>
               <a:extLst>
                 <a:ext uri="{91240B29-F687-4f45-9708-019B960494DF}">
-                  <a14:hiddenLine xmlns:a14="http://schemas.microsoft.com/office/drawing/2010/main" xmlns="" w="9525">
+                  <a14:hiddenLine xmlns="" xmlns:a14="http://schemas.microsoft.com/office/drawing/2010/main" w="9525">
                     <a:solidFill>
                       <a:srgbClr val="000000"/>
                     </a:solidFill>
@@ -10033,7 +10033,7 @@
               </a:ln>
               <a:extLst>
                 <a:ext uri="{91240B29-F687-4f45-9708-019B960494DF}">
-                  <a14:hiddenLine xmlns:a14="http://schemas.microsoft.com/office/drawing/2010/main" xmlns="" w="9525">
+                  <a14:hiddenLine xmlns="" xmlns:a14="http://schemas.microsoft.com/office/drawing/2010/main" w="9525">
                     <a:solidFill>
                       <a:srgbClr val="000000"/>
                     </a:solidFill>
@@ -10095,7 +10095,7 @@
               </a:ln>
               <a:extLst>
                 <a:ext uri="{91240B29-F687-4f45-9708-019B960494DF}">
-                  <a14:hiddenLine xmlns:a14="http://schemas.microsoft.com/office/drawing/2010/main" xmlns="" w="9525">
+                  <a14:hiddenLine xmlns="" xmlns:a14="http://schemas.microsoft.com/office/drawing/2010/main" w="9525">
                     <a:solidFill>
                       <a:srgbClr val="000000"/>
                     </a:solidFill>
@@ -10157,7 +10157,7 @@
               </a:ln>
               <a:extLst>
                 <a:ext uri="{91240B29-F687-4f45-9708-019B960494DF}">
-                  <a14:hiddenLine xmlns:a14="http://schemas.microsoft.com/office/drawing/2010/main" xmlns="" w="9525">
+                  <a14:hiddenLine xmlns="" xmlns:a14="http://schemas.microsoft.com/office/drawing/2010/main" w="9525">
                     <a:solidFill>
                       <a:srgbClr val="000000"/>
                     </a:solidFill>
@@ -10247,7 +10247,7 @@
               </a:ln>
               <a:extLst>
                 <a:ext uri="{91240B29-F687-4f45-9708-019B960494DF}">
-                  <a14:hiddenLine xmlns:a14="http://schemas.microsoft.com/office/drawing/2010/main" xmlns="" w="9525">
+                  <a14:hiddenLine xmlns="" xmlns:a14="http://schemas.microsoft.com/office/drawing/2010/main" w="9525">
                     <a:solidFill>
                       <a:srgbClr val="000000"/>
                     </a:solidFill>
@@ -10281,7 +10281,7 @@
               </a:ln>
               <a:extLst>
                 <a:ext uri="{91240B29-F687-4f45-9708-019B960494DF}">
-                  <a14:hiddenLine xmlns:a14="http://schemas.microsoft.com/office/drawing/2010/main" xmlns="" w="9525">
+                  <a14:hiddenLine xmlns="" xmlns:a14="http://schemas.microsoft.com/office/drawing/2010/main" w="9525">
                     <a:solidFill>
                       <a:srgbClr val="000000"/>
                     </a:solidFill>
@@ -10346,7 +10346,7 @@
               </a:ln>
               <a:extLst>
                 <a:ext uri="{91240B29-F687-4f45-9708-019B960494DF}">
-                  <a14:hiddenLine xmlns:a14="http://schemas.microsoft.com/office/drawing/2010/main" xmlns="" w="9525">
+                  <a14:hiddenLine xmlns="" xmlns:a14="http://schemas.microsoft.com/office/drawing/2010/main" w="9525">
                     <a:solidFill>
                       <a:srgbClr val="000000"/>
                     </a:solidFill>
@@ -10436,7 +10436,7 @@
               </a:ln>
               <a:extLst>
                 <a:ext uri="{91240B29-F687-4f45-9708-019B960494DF}">
-                  <a14:hiddenLine xmlns:a14="http://schemas.microsoft.com/office/drawing/2010/main" xmlns="" w="9525">
+                  <a14:hiddenLine xmlns="" xmlns:a14="http://schemas.microsoft.com/office/drawing/2010/main" w="9525">
                     <a:solidFill>
                       <a:srgbClr val="000000"/>
                     </a:solidFill>
@@ -10498,7 +10498,7 @@
               </a:ln>
               <a:extLst>
                 <a:ext uri="{91240B29-F687-4f45-9708-019B960494DF}">
-                  <a14:hiddenLine xmlns:a14="http://schemas.microsoft.com/office/drawing/2010/main" xmlns="" w="9525">
+                  <a14:hiddenLine xmlns="" xmlns:a14="http://schemas.microsoft.com/office/drawing/2010/main" w="9525">
                     <a:solidFill>
                       <a:srgbClr val="000000"/>
                     </a:solidFill>
@@ -10588,7 +10588,7 @@
               </a:ln>
               <a:extLst>
                 <a:ext uri="{91240B29-F687-4f45-9708-019B960494DF}">
-                  <a14:hiddenLine xmlns:a14="http://schemas.microsoft.com/office/drawing/2010/main" xmlns="" w="9525">
+                  <a14:hiddenLine xmlns="" xmlns:a14="http://schemas.microsoft.com/office/drawing/2010/main" w="9525">
                     <a:solidFill>
                       <a:srgbClr val="000000"/>
                     </a:solidFill>
@@ -10653,7 +10653,7 @@
               </a:ln>
               <a:extLst>
                 <a:ext uri="{91240B29-F687-4f45-9708-019B960494DF}">
-                  <a14:hiddenLine xmlns:a14="http://schemas.microsoft.com/office/drawing/2010/main" xmlns="" w="9525">
+                  <a14:hiddenLine xmlns="" xmlns:a14="http://schemas.microsoft.com/office/drawing/2010/main" w="9525">
                     <a:solidFill>
                       <a:srgbClr val="000000"/>
                     </a:solidFill>
@@ -10715,7 +10715,7 @@
               </a:ln>
               <a:extLst>
                 <a:ext uri="{91240B29-F687-4f45-9708-019B960494DF}">
-                  <a14:hiddenLine xmlns:a14="http://schemas.microsoft.com/office/drawing/2010/main" xmlns="" w="9525">
+                  <a14:hiddenLine xmlns="" xmlns:a14="http://schemas.microsoft.com/office/drawing/2010/main" w="9525">
                     <a:solidFill>
                       <a:srgbClr val="000000"/>
                     </a:solidFill>
@@ -10805,7 +10805,7 @@
               </a:ln>
               <a:extLst>
                 <a:ext uri="{91240B29-F687-4f45-9708-019B960494DF}">
-                  <a14:hiddenLine xmlns:a14="http://schemas.microsoft.com/office/drawing/2010/main" xmlns="" w="9525">
+                  <a14:hiddenLine xmlns="" xmlns:a14="http://schemas.microsoft.com/office/drawing/2010/main" w="9525">
                     <a:solidFill>
                       <a:srgbClr val="000000"/>
                     </a:solidFill>
@@ -10895,7 +10895,7 @@
               </a:ln>
               <a:extLst>
                 <a:ext uri="{91240B29-F687-4f45-9708-019B960494DF}">
-                  <a14:hiddenLine xmlns:a14="http://schemas.microsoft.com/office/drawing/2010/main" xmlns="" w="9525">
+                  <a14:hiddenLine xmlns="" xmlns:a14="http://schemas.microsoft.com/office/drawing/2010/main" w="9525">
                     <a:solidFill>
                       <a:srgbClr val="000000"/>
                     </a:solidFill>
@@ -10960,7 +10960,7 @@
               </a:ln>
               <a:extLst>
                 <a:ext uri="{91240B29-F687-4f45-9708-019B960494DF}">
-                  <a14:hiddenLine xmlns:a14="http://schemas.microsoft.com/office/drawing/2010/main" xmlns="" w="9525">
+                  <a14:hiddenLine xmlns="" xmlns:a14="http://schemas.microsoft.com/office/drawing/2010/main" w="9525">
                     <a:solidFill>
                       <a:srgbClr val="000000"/>
                     </a:solidFill>
@@ -11080,7 +11080,7 @@
               </a:ln>
               <a:extLst>
                 <a:ext uri="{91240B29-F687-4f45-9708-019B960494DF}">
-                  <a14:hiddenLine xmlns:a14="http://schemas.microsoft.com/office/drawing/2010/main" xmlns="" w="9525">
+                  <a14:hiddenLine xmlns="" xmlns:a14="http://schemas.microsoft.com/office/drawing/2010/main" w="9525">
                     <a:solidFill>
                       <a:srgbClr val="000000"/>
                     </a:solidFill>
@@ -11178,7 +11178,7 @@
               </a:ln>
               <a:extLst>
                 <a:ext uri="{91240B29-F687-4f45-9708-019B960494DF}">
-                  <a14:hiddenLine xmlns:a14="http://schemas.microsoft.com/office/drawing/2010/main" xmlns="" w="9525">
+                  <a14:hiddenLine xmlns="" xmlns:a14="http://schemas.microsoft.com/office/drawing/2010/main" w="9525">
                     <a:solidFill>
                       <a:srgbClr val="000000"/>
                     </a:solidFill>
@@ -11293,7 +11293,7 @@
               </a:ln>
               <a:extLst>
                 <a:ext uri="{91240B29-F687-4f45-9708-019B960494DF}">
-                  <a14:hiddenLine xmlns:a14="http://schemas.microsoft.com/office/drawing/2010/main" xmlns="" w="9525">
+                  <a14:hiddenLine xmlns="" xmlns:a14="http://schemas.microsoft.com/office/drawing/2010/main" w="9525">
                     <a:solidFill>
                       <a:srgbClr val="000000"/>
                     </a:solidFill>
@@ -11383,7 +11383,7 @@
               </a:ln>
               <a:extLst>
                 <a:ext uri="{91240B29-F687-4f45-9708-019B960494DF}">
-                  <a14:hiddenLine xmlns:a14="http://schemas.microsoft.com/office/drawing/2010/main" xmlns="" w="9525">
+                  <a14:hiddenLine xmlns="" xmlns:a14="http://schemas.microsoft.com/office/drawing/2010/main" w="9525">
                     <a:solidFill>
                       <a:srgbClr val="000000"/>
                     </a:solidFill>
@@ -11448,7 +11448,7 @@
               </a:ln>
               <a:extLst>
                 <a:ext uri="{91240B29-F687-4f45-9708-019B960494DF}">
-                  <a14:hiddenLine xmlns:a14="http://schemas.microsoft.com/office/drawing/2010/main" xmlns="" w="9525">
+                  <a14:hiddenLine xmlns="" xmlns:a14="http://schemas.microsoft.com/office/drawing/2010/main" w="9525">
                     <a:solidFill>
                       <a:srgbClr val="000000"/>
                     </a:solidFill>
@@ -11538,7 +11538,7 @@
               </a:ln>
               <a:extLst>
                 <a:ext uri="{91240B29-F687-4f45-9708-019B960494DF}">
-                  <a14:hiddenLine xmlns:a14="http://schemas.microsoft.com/office/drawing/2010/main" xmlns="" w="9525">
+                  <a14:hiddenLine xmlns="" xmlns:a14="http://schemas.microsoft.com/office/drawing/2010/main" w="9525">
                     <a:solidFill>
                       <a:srgbClr val="000000"/>
                     </a:solidFill>
@@ -11606,7 +11606,7 @@
               </a:ln>
               <a:extLst>
                 <a:ext uri="{91240B29-F687-4f45-9708-019B960494DF}">
-                  <a14:hiddenLine xmlns:a14="http://schemas.microsoft.com/office/drawing/2010/main" xmlns="" w="9525">
+                  <a14:hiddenLine xmlns="" xmlns:a14="http://schemas.microsoft.com/office/drawing/2010/main" w="9525">
                     <a:solidFill>
                       <a:srgbClr val="000000"/>
                     </a:solidFill>
@@ -11696,7 +11696,7 @@
               </a:ln>
               <a:extLst>
                 <a:ext uri="{91240B29-F687-4f45-9708-019B960494DF}">
-                  <a14:hiddenLine xmlns:a14="http://schemas.microsoft.com/office/drawing/2010/main" xmlns="" w="9525">
+                  <a14:hiddenLine xmlns="" xmlns:a14="http://schemas.microsoft.com/office/drawing/2010/main" w="9525">
                     <a:solidFill>
                       <a:srgbClr val="000000"/>
                     </a:solidFill>
@@ -11764,7 +11764,7 @@
               </a:ln>
               <a:extLst>
                 <a:ext uri="{91240B29-F687-4f45-9708-019B960494DF}">
-                  <a14:hiddenLine xmlns:a14="http://schemas.microsoft.com/office/drawing/2010/main" xmlns="" w="9525">
+                  <a14:hiddenLine xmlns="" xmlns:a14="http://schemas.microsoft.com/office/drawing/2010/main" w="9525">
                     <a:solidFill>
                       <a:srgbClr val="000000"/>
                     </a:solidFill>
@@ -11854,7 +11854,7 @@
               </a:ln>
               <a:extLst>
                 <a:ext uri="{91240B29-F687-4f45-9708-019B960494DF}">
-                  <a14:hiddenLine xmlns:a14="http://schemas.microsoft.com/office/drawing/2010/main" xmlns="" w="9525">
+                  <a14:hiddenLine xmlns="" xmlns:a14="http://schemas.microsoft.com/office/drawing/2010/main" w="9525">
                     <a:solidFill>
                       <a:srgbClr val="000000"/>
                     </a:solidFill>
@@ -11888,7 +11888,7 @@
               </a:ln>
               <a:extLst>
                 <a:ext uri="{91240B29-F687-4f45-9708-019B960494DF}">
-                  <a14:hiddenLine xmlns:a14="http://schemas.microsoft.com/office/drawing/2010/main" xmlns="" w="9525">
+                  <a14:hiddenLine xmlns="" xmlns:a14="http://schemas.microsoft.com/office/drawing/2010/main" w="9525">
                     <a:solidFill>
                       <a:srgbClr val="000000"/>
                     </a:solidFill>
@@ -12028,7 +12028,7 @@
           <a:p>
             <a:fld id="{841D4EFB-1649-4F74-89D1-9FCA056B78EF}" type="datetimeFigureOut">
               <a:rPr lang="en-US" smtClean="0"/>
-              <a:t>1/30/2015</a:t>
+              <a:t>30-Jan-15</a:t>
             </a:fld>
             <a:endParaRPr lang="en-US"/>
           </a:p>
@@ -12476,8 +12476,8 @@
               <a:t>Създаване на програми с графичен </a:t>
             </a:r>
             <a:r>
-              <a:rPr lang="bg-BG" dirty="0" err="1" smtClean="0"/>
-              <a:t>интерфей</a:t>
+              <a:rPr lang="bg-BG" dirty="0" smtClean="0"/>
+              <a:t>интерфейс</a:t>
             </a:r>
             <a:endParaRPr lang="en-US" dirty="0"/>
           </a:p>
@@ -12778,16 +12778,24 @@
               <a:t>Направете програма за управление на служители във фирма. Програмата трябва да съдържа форма за въвеждане на служител (име фамилия, </a:t>
             </a:r>
             <a:r>
-              <a:rPr lang="bg-BG" dirty="0" err="1" smtClean="0"/>
-              <a:t>телфон</a:t>
+              <a:rPr lang="bg-BG" dirty="0" smtClean="0"/>
+              <a:t>тел</a:t>
+            </a:r>
+            <a:r>
+              <a:rPr lang="bg-BG" dirty="0"/>
+              <a:t>е</a:t>
+            </a:r>
+            <a:r>
+              <a:rPr lang="bg-BG" dirty="0" smtClean="0"/>
+              <a:t>фон</a:t>
             </a:r>
             <a:r>
               <a:rPr lang="bg-BG" dirty="0" smtClean="0"/>
               <a:t>, години, месечна заплата в лева). Формата трябва да се показва при натискане на бутон добави служител. Главната форма на програмата трябва да съдържа бутон „</a:t>
             </a:r>
             <a:r>
-              <a:rPr lang="bg-BG" dirty="0" err="1" smtClean="0"/>
-              <a:t>Изцисли</a:t>
+              <a:rPr lang="bg-BG" dirty="0" smtClean="0"/>
+              <a:t>Изчисли</a:t>
             </a:r>
             <a:r>
               <a:rPr lang="bg-BG" dirty="0" smtClean="0"/>
@@ -13651,7 +13659,23 @@
           <a:p>
             <a:r>
               <a:rPr lang="bg-BG" dirty="0" smtClean="0"/>
-              <a:t>Направете програма която извежда на екрана вашите име в </a:t>
+              <a:t>Направете програма която извежда на екрана вашите </a:t>
+            </a:r>
+            <a:r>
+              <a:rPr lang="bg-BG" dirty="0" smtClean="0"/>
+              <a:t>име</a:t>
+            </a:r>
+            <a:r>
+              <a:rPr lang="bg-BG" dirty="0" smtClean="0"/>
+              <a:t>на</a:t>
+            </a:r>
+            <a:r>
+              <a:rPr lang="bg-BG" dirty="0" smtClean="0"/>
+              <a:t> </a:t>
+            </a:r>
+            <a:r>
+              <a:rPr lang="bg-BG" dirty="0" smtClean="0"/>
+              <a:t>в </a:t>
             </a:r>
             <a:r>
               <a:rPr lang="en-US" dirty="0" smtClean="0"/>

</xml_diff>